<commit_message>
final presentation capstone with R
</commit_message>
<xml_diff>
--- a/ds-r-capstone-template.pptx
+++ b/ds-r-capstone-template.pptx
@@ -270,7 +270,7 @@
           <a:p>
             <a:fld id="{9E497948-54D2-43F8-9A63-A99FE3051738}" type="datetimeFigureOut">
               <a:rPr lang="en-US" smtClean="0"/>
-              <a:t>5/14/21</a:t>
+              <a:t>8/30/2023</a:t>
             </a:fld>
             <a:endParaRPr lang="en-US"/>
           </a:p>
@@ -4247,14 +4247,15 @@
           <a:p>
             <a:r>
               <a:rPr lang="en-US" dirty="0"/>
-              <a:t>&lt;LEARNER’s Name&gt;</a:t>
-            </a:r>
-          </a:p>
-          <a:p>
-            <a:r>
-              <a:rPr lang="en-US" dirty="0"/>
-              <a:t>&lt;Date&gt;</a:t>
-            </a:r>
+              <a:t>Brian Seko</a:t>
+            </a:r>
+          </a:p>
+          <a:p>
+            <a:r>
+              <a:rPr lang="en-US"/>
+              <a:t>August 2023</a:t>
+            </a:r>
+            <a:endParaRPr lang="en-US" dirty="0"/>
           </a:p>
         </p:txBody>
       </p:sp>
@@ -6474,6 +6475,13 @@
           </p:nvPr>
         </p:nvSpPr>
         <p:spPr/>
+        <p:txBody>
+          <a:bodyPr/>
+          <a:lstStyle/>
+          <a:p>
+            <a:endParaRPr lang="en-US"/>
+          </a:p>
+        </p:txBody>
       </p:sp>
       <p:sp>
         <p:nvSpPr>
@@ -6622,6 +6630,13 @@
           </p:nvPr>
         </p:nvSpPr>
         <p:spPr/>
+        <p:txBody>
+          <a:bodyPr/>
+          <a:lstStyle/>
+          <a:p>
+            <a:endParaRPr lang="en-US"/>
+          </a:p>
+        </p:txBody>
       </p:sp>
       <p:sp>
         <p:nvSpPr>
@@ -6770,6 +6785,13 @@
           </p:nvPr>
         </p:nvSpPr>
         <p:spPr/>
+        <p:txBody>
+          <a:bodyPr/>
+          <a:lstStyle/>
+          <a:p>
+            <a:endParaRPr lang="en-US"/>
+          </a:p>
+        </p:txBody>
       </p:sp>
       <p:sp>
         <p:nvSpPr>
@@ -6918,6 +6940,13 @@
           </p:nvPr>
         </p:nvSpPr>
         <p:spPr/>
+        <p:txBody>
+          <a:bodyPr/>
+          <a:lstStyle/>
+          <a:p>
+            <a:endParaRPr lang="en-US"/>
+          </a:p>
+        </p:txBody>
       </p:sp>
       <p:sp>
         <p:nvSpPr>
@@ -7186,6 +7215,13 @@
           </p:nvPr>
         </p:nvSpPr>
         <p:spPr/>
+        <p:txBody>
+          <a:bodyPr/>
+          <a:lstStyle/>
+          <a:p>
+            <a:endParaRPr lang="en-US"/>
+          </a:p>
+        </p:txBody>
       </p:sp>
       <p:sp>
         <p:nvSpPr>
@@ -7338,6 +7374,13 @@
           </p:nvPr>
         </p:nvSpPr>
         <p:spPr/>
+        <p:txBody>
+          <a:bodyPr/>
+          <a:lstStyle/>
+          <a:p>
+            <a:endParaRPr lang="en-US"/>
+          </a:p>
+        </p:txBody>
       </p:sp>
       <p:sp>
         <p:nvSpPr>
@@ -8003,6 +8046,13 @@
           </p:nvPr>
         </p:nvSpPr>
         <p:spPr/>
+        <p:txBody>
+          <a:bodyPr/>
+          <a:lstStyle/>
+          <a:p>
+            <a:endParaRPr lang="en-US"/>
+          </a:p>
+        </p:txBody>
       </p:sp>
       <p:sp>
         <p:nvSpPr>
@@ -10708,12 +10758,6 @@
 </file>
 
 <file path=customXml/item1.xml><?xml version="1.0" encoding="utf-8"?>
-<p:properties xmlns:p="http://schemas.microsoft.com/office/2006/metadata/properties" xmlns:xsi="http://www.w3.org/2001/XMLSchema-instance" xmlns:pc="http://schemas.microsoft.com/office/infopath/2007/PartnerControls">
-  <documentManagement/>
-</p:properties>
-</file>
-
-<file path=customXml/item2.xml><?xml version="1.0" encoding="utf-8"?>
 <ct:contentTypeSchema xmlns:ct="http://schemas.microsoft.com/office/2006/metadata/contentType" xmlns:ma="http://schemas.microsoft.com/office/2006/metadata/properties/metaAttributes" ct:_="" ma:_="" ma:contentTypeName="Document" ma:contentTypeID="0x010100EECD86F56755A646AC8AFCBCBD967F21" ma:contentTypeVersion="12" ma:contentTypeDescription="Create a new document." ma:contentTypeScope="" ma:versionID="5271f8e20090c87afed7729ac71f61b2">
   <xsd:schema xmlns:xsd="http://www.w3.org/2001/XMLSchema" xmlns:xs="http://www.w3.org/2001/XMLSchema" xmlns:p="http://schemas.microsoft.com/office/2006/metadata/properties" xmlns:ns2="155be751-a274-42e8-93fb-f39d3b9bccc8" xmlns:ns3="f80a141d-92ca-4d3d-9308-f7e7b1d44ce8" targetNamespace="http://schemas.microsoft.com/office/2006/metadata/properties" ma:root="true" ma:fieldsID="cf12c133eb44377ebd94fdb7db4757b0" ns2:_="" ns3:_="">
     <xsd:import namespace="155be751-a274-42e8-93fb-f39d3b9bccc8"/>
@@ -10930,6 +10974,12 @@
 </ct:contentTypeSchema>
 </file>
 
+<file path=customXml/item2.xml><?xml version="1.0" encoding="utf-8"?>
+<p:properties xmlns:p="http://schemas.microsoft.com/office/2006/metadata/properties" xmlns:xsi="http://www.w3.org/2001/XMLSchema-instance" xmlns:pc="http://schemas.microsoft.com/office/infopath/2007/PartnerControls">
+  <documentManagement/>
+</p:properties>
+</file>
+
 <file path=customXml/item3.xml><?xml version="1.0" encoding="utf-8"?>
 <?mso-contentType ?>
 <FormTemplates xmlns="http://schemas.microsoft.com/sharepoint/v3/contenttype/forms">
@@ -10940,23 +10990,6 @@
 </file>
 
 <file path=customXml/itemProps1.xml><?xml version="1.0" encoding="utf-8"?>
-<ds:datastoreItem xmlns:ds="http://schemas.openxmlformats.org/officeDocument/2006/customXml" ds:itemID="{54DA07C5-A406-4A0D-B3E6-3856C94AC7F3}">
-  <ds:schemaRefs>
-    <ds:schemaRef ds:uri="http://purl.org/dc/terms/"/>
-    <ds:schemaRef ds:uri="http://schemas.microsoft.com/office/2006/documentManagement/types"/>
-    <ds:schemaRef ds:uri="http://schemas.microsoft.com/office/infopath/2007/PartnerControls"/>
-    <ds:schemaRef ds:uri="http://purl.org/dc/elements/1.1/"/>
-    <ds:schemaRef ds:uri="http://schemas.openxmlformats.org/package/2006/metadata/core-properties"/>
-    <ds:schemaRef ds:uri="http://schemas.microsoft.com/office/2006/metadata/properties"/>
-    <ds:schemaRef ds:uri="f80a141d-92ca-4d3d-9308-f7e7b1d44ce8"/>
-    <ds:schemaRef ds:uri="155be751-a274-42e8-93fb-f39d3b9bccc8"/>
-    <ds:schemaRef ds:uri="http://www.w3.org/XML/1998/namespace"/>
-    <ds:schemaRef ds:uri="http://purl.org/dc/dcmitype/"/>
-  </ds:schemaRefs>
-</ds:datastoreItem>
-</file>
-
-<file path=customXml/itemProps2.xml><?xml version="1.0" encoding="utf-8"?>
 <ds:datastoreItem xmlns:ds="http://schemas.openxmlformats.org/officeDocument/2006/customXml" ds:itemID="{FD840426-F08D-42AC-9846-A20E4AB85A26}">
   <ds:schemaRefs>
     <ds:schemaRef ds:uri="155be751-a274-42e8-93fb-f39d3b9bccc8"/>
@@ -10975,6 +11008,23 @@
 </ds:datastoreItem>
 </file>
 
+<file path=customXml/itemProps2.xml><?xml version="1.0" encoding="utf-8"?>
+<ds:datastoreItem xmlns:ds="http://schemas.openxmlformats.org/officeDocument/2006/customXml" ds:itemID="{54DA07C5-A406-4A0D-B3E6-3856C94AC7F3}">
+  <ds:schemaRefs>
+    <ds:schemaRef ds:uri="http://purl.org/dc/terms/"/>
+    <ds:schemaRef ds:uri="http://schemas.microsoft.com/office/2006/documentManagement/types"/>
+    <ds:schemaRef ds:uri="http://schemas.microsoft.com/office/infopath/2007/PartnerControls"/>
+    <ds:schemaRef ds:uri="http://purl.org/dc/elements/1.1/"/>
+    <ds:schemaRef ds:uri="http://schemas.openxmlformats.org/package/2006/metadata/core-properties"/>
+    <ds:schemaRef ds:uri="http://schemas.microsoft.com/office/2006/metadata/properties"/>
+    <ds:schemaRef ds:uri="f80a141d-92ca-4d3d-9308-f7e7b1d44ce8"/>
+    <ds:schemaRef ds:uri="155be751-a274-42e8-93fb-f39d3b9bccc8"/>
+    <ds:schemaRef ds:uri="http://www.w3.org/XML/1998/namespace"/>
+    <ds:schemaRef ds:uri="http://purl.org/dc/dcmitype/"/>
+  </ds:schemaRefs>
+</ds:datastoreItem>
+</file>
+
 <file path=customXml/itemProps3.xml><?xml version="1.0" encoding="utf-8"?>
 <ds:datastoreItem xmlns:ds="http://schemas.openxmlformats.org/officeDocument/2006/customXml" ds:itemID="{7EFDA260-DDA0-422C-B7AE-778F653FBB36}">
   <ds:schemaRefs>

</xml_diff>